<commit_message>
Re-compiled data-viz-01 and data-viz-02 complete slides.
</commit_message>
<xml_diff>
--- a/data-viz-01/src/complete-lecture-scatterplots.pptx
+++ b/data-viz-01/src/complete-lecture-scatterplots.pptx
@@ -52704,6 +52704,428 @@
             <a:r>
               <a:rPr/>
               <a:t>color.</a:t>
+            </a:r>
+          </a:p>
+          <a:p>
+            <a:pPr lvl="0" marL="0" indent="0">
+              <a:buNone/>
+            </a:pPr>
+          </a:p>
+          <a:p>
+            <a:pPr lvl="0" marL="0" indent="0">
+              <a:buNone/>
+            </a:pPr>
+            <a:r>
+              <a:rPr/>
+              <a:t>(Note</a:t>
+            </a:r>
+            <a:r>
+              <a:rPr/>
+              <a:t> </a:t>
+            </a:r>
+            <a:r>
+              <a:rPr/>
+              <a:t>to</a:t>
+            </a:r>
+            <a:r>
+              <a:rPr/>
+              <a:t> </a:t>
+            </a:r>
+            <a:r>
+              <a:rPr/>
+              <a:t>myself)</a:t>
+            </a:r>
+            <a:r>
+              <a:rPr/>
+              <a:t> </a:t>
+            </a:r>
+            <a:r>
+              <a:rPr/>
+              <a:t>The</a:t>
+            </a:r>
+            <a:r>
+              <a:rPr/>
+              <a:t> </a:t>
+            </a:r>
+            <a:r>
+              <a:rPr/>
+              <a:t>use</a:t>
+            </a:r>
+            <a:r>
+              <a:rPr/>
+              <a:t> </a:t>
+            </a:r>
+            <a:r>
+              <a:rPr/>
+              <a:t>of</a:t>
+            </a:r>
+            <a:r>
+              <a:rPr/>
+              <a:t> </a:t>
+            </a:r>
+            <a:r>
+              <a:rPr/>
+              <a:t>panels</a:t>
+            </a:r>
+            <a:r>
+              <a:rPr/>
+              <a:t> </a:t>
+            </a:r>
+            <a:r>
+              <a:rPr/>
+              <a:t>is</a:t>
+            </a:r>
+            <a:r>
+              <a:rPr/>
+              <a:t> </a:t>
+            </a:r>
+            <a:r>
+              <a:rPr/>
+              <a:t>an</a:t>
+            </a:r>
+            <a:r>
+              <a:rPr/>
+              <a:t> </a:t>
+            </a:r>
+            <a:r>
+              <a:rPr/>
+              <a:t>important</a:t>
+            </a:r>
+            <a:r>
+              <a:rPr/>
+              <a:t> </a:t>
+            </a:r>
+            <a:r>
+              <a:rPr/>
+              <a:t>aspect</a:t>
+            </a:r>
+            <a:r>
+              <a:rPr/>
+              <a:t> </a:t>
+            </a:r>
+            <a:r>
+              <a:rPr/>
+              <a:t>of</a:t>
+            </a:r>
+            <a:r>
+              <a:rPr/>
+              <a:t> </a:t>
+            </a:r>
+            <a:r>
+              <a:rPr/>
+              <a:t>visualization,</a:t>
+            </a:r>
+            <a:r>
+              <a:rPr/>
+              <a:t> </a:t>
+            </a:r>
+            <a:r>
+              <a:rPr/>
+              <a:t>and</a:t>
+            </a:r>
+            <a:r>
+              <a:rPr/>
+              <a:t> </a:t>
+            </a:r>
+            <a:r>
+              <a:rPr/>
+              <a:t>it</a:t>
+            </a:r>
+            <a:r>
+              <a:rPr/>
+              <a:t> </a:t>
+            </a:r>
+            <a:r>
+              <a:rPr/>
+              <a:t>is</a:t>
+            </a:r>
+            <a:r>
+              <a:rPr/>
+              <a:t> </a:t>
+            </a:r>
+            <a:r>
+              <a:rPr/>
+              <a:t>unclear</a:t>
+            </a:r>
+            <a:r>
+              <a:rPr/>
+              <a:t> </a:t>
+            </a:r>
+            <a:r>
+              <a:rPr/>
+              <a:t>to</a:t>
+            </a:r>
+            <a:r>
+              <a:rPr/>
+              <a:t> </a:t>
+            </a:r>
+            <a:r>
+              <a:rPr/>
+              <a:t>me</a:t>
+            </a:r>
+            <a:r>
+              <a:rPr/>
+              <a:t> </a:t>
+            </a:r>
+            <a:r>
+              <a:rPr/>
+              <a:t>where</a:t>
+            </a:r>
+            <a:r>
+              <a:rPr/>
+              <a:t> </a:t>
+            </a:r>
+            <a:r>
+              <a:rPr/>
+              <a:t>best</a:t>
+            </a:r>
+            <a:r>
+              <a:rPr/>
+              <a:t> </a:t>
+            </a:r>
+            <a:r>
+              <a:rPr/>
+              <a:t>to</a:t>
+            </a:r>
+            <a:r>
+              <a:rPr/>
+              <a:t> </a:t>
+            </a:r>
+            <a:r>
+              <a:rPr/>
+              <a:t>introduce</a:t>
+            </a:r>
+            <a:r>
+              <a:rPr/>
+              <a:t> </a:t>
+            </a:r>
+            <a:r>
+              <a:rPr/>
+              <a:t>it.</a:t>
+            </a:r>
+            <a:r>
+              <a:rPr/>
+              <a:t> </a:t>
+            </a:r>
+            <a:r>
+              <a:rPr/>
+              <a:t>Possibly</a:t>
+            </a:r>
+            <a:r>
+              <a:rPr/>
+              <a:t> </a:t>
+            </a:r>
+            <a:r>
+              <a:rPr/>
+              <a:t>it</a:t>
+            </a:r>
+            <a:r>
+              <a:rPr/>
+              <a:t> </a:t>
+            </a:r>
+            <a:r>
+              <a:rPr/>
+              <a:t>could</a:t>
+            </a:r>
+            <a:r>
+              <a:rPr/>
+              <a:t> </a:t>
+            </a:r>
+            <a:r>
+              <a:rPr/>
+              <a:t>be</a:t>
+            </a:r>
+            <a:r>
+              <a:rPr/>
+              <a:t> </a:t>
+            </a:r>
+            <a:r>
+              <a:rPr/>
+              <a:t>another</a:t>
+            </a:r>
+            <a:r>
+              <a:rPr/>
+              <a:t> </a:t>
+            </a:r>
+            <a:r>
+              <a:rPr/>
+              <a:t>dimension</a:t>
+            </a:r>
+            <a:r>
+              <a:rPr/>
+              <a:t> </a:t>
+            </a:r>
+            <a:r>
+              <a:rPr/>
+              <a:t>of</a:t>
+            </a:r>
+            <a:r>
+              <a:rPr/>
+              <a:t> </a:t>
+            </a:r>
+            <a:r>
+              <a:rPr/>
+              <a:t>location.</a:t>
+            </a:r>
+            <a:r>
+              <a:rPr/>
+              <a:t> </a:t>
+            </a:r>
+            <a:r>
+              <a:rPr/>
+              <a:t>You</a:t>
+            </a:r>
+            <a:r>
+              <a:rPr/>
+              <a:t> </a:t>
+            </a:r>
+            <a:r>
+              <a:rPr/>
+              <a:t>have</a:t>
+            </a:r>
+            <a:r>
+              <a:rPr/>
+              <a:t> </a:t>
+            </a:r>
+            <a:r>
+              <a:rPr/>
+              <a:t>your</a:t>
+            </a:r>
+            <a:r>
+              <a:rPr/>
+              <a:t> </a:t>
+            </a:r>
+            <a:r>
+              <a:rPr/>
+              <a:t>x</a:t>
+            </a:r>
+            <a:r>
+              <a:rPr/>
+              <a:t> </a:t>
+            </a:r>
+            <a:r>
+              <a:rPr/>
+              <a:t>position</a:t>
+            </a:r>
+            <a:r>
+              <a:rPr/>
+              <a:t> </a:t>
+            </a:r>
+            <a:r>
+              <a:rPr/>
+              <a:t>and</a:t>
+            </a:r>
+            <a:r>
+              <a:rPr/>
+              <a:t> </a:t>
+            </a:r>
+            <a:r>
+              <a:rPr/>
+              <a:t>your</a:t>
+            </a:r>
+            <a:r>
+              <a:rPr/>
+              <a:t> </a:t>
+            </a:r>
+            <a:r>
+              <a:rPr/>
+              <a:t>y</a:t>
+            </a:r>
+            <a:r>
+              <a:rPr/>
+              <a:t> </a:t>
+            </a:r>
+            <a:r>
+              <a:rPr/>
+              <a:t>position,</a:t>
+            </a:r>
+            <a:r>
+              <a:rPr/>
+              <a:t> </a:t>
+            </a:r>
+            <a:r>
+              <a:rPr/>
+              <a:t>but</a:t>
+            </a:r>
+            <a:r>
+              <a:rPr/>
+              <a:t> </a:t>
+            </a:r>
+            <a:r>
+              <a:rPr/>
+              <a:t>you</a:t>
+            </a:r>
+            <a:r>
+              <a:rPr/>
+              <a:t> </a:t>
+            </a:r>
+            <a:r>
+              <a:rPr/>
+              <a:t>also</a:t>
+            </a:r>
+            <a:r>
+              <a:rPr/>
+              <a:t> </a:t>
+            </a:r>
+            <a:r>
+              <a:rPr/>
+              <a:t>have</a:t>
+            </a:r>
+            <a:r>
+              <a:rPr/>
+              <a:t> </a:t>
+            </a:r>
+            <a:r>
+              <a:rPr/>
+              <a:t>a</a:t>
+            </a:r>
+            <a:r>
+              <a:rPr/>
+              <a:t> </a:t>
+            </a:r>
+            <a:r>
+              <a:rPr/>
+              <a:t>position</a:t>
+            </a:r>
+            <a:r>
+              <a:rPr/>
+              <a:t> </a:t>
+            </a:r>
+            <a:r>
+              <a:rPr/>
+              <a:t>within</a:t>
+            </a:r>
+            <a:r>
+              <a:rPr/>
+              <a:t> </a:t>
+            </a:r>
+            <a:r>
+              <a:rPr/>
+              <a:t>one</a:t>
+            </a:r>
+            <a:r>
+              <a:rPr/>
+              <a:t> </a:t>
+            </a:r>
+            <a:r>
+              <a:rPr/>
+              <a:t>of</a:t>
+            </a:r>
+            <a:r>
+              <a:rPr/>
+              <a:t> </a:t>
+            </a:r>
+            <a:r>
+              <a:rPr/>
+              <a:t>several</a:t>
+            </a:r>
+            <a:r>
+              <a:rPr/>
+              <a:t> </a:t>
+            </a:r>
+            <a:r>
+              <a:rPr/>
+              <a:t>panels.</a:t>
             </a:r>
           </a:p>
         </p:txBody>

</xml_diff>